<commit_message>
Last update compare added.
</commit_message>
<xml_diff>
--- a/DSCP Sunum.pptx
+++ b/DSCP Sunum.pptx
@@ -6322,7 +6322,7 @@
         <p:spPr/>
         <p:txBody>
           <a:bodyPr>
-            <a:normAutofit lnSpcReduction="10000"/>
+            <a:normAutofit fontScale="85000" lnSpcReduction="20000"/>
           </a:bodyPr>
           <a:lstStyle/>
           <a:p>
@@ -6736,6 +6736,43 @@
               <a:rPr lang="tr-TR" dirty="0"/>
               <a:t>.</a:t>
             </a:r>
+          </a:p>
+          <a:p>
+            <a:endParaRPr lang="tr-TR" dirty="0"/>
+          </a:p>
+          <a:p>
+            <a:r>
+              <a:rPr lang="tr-TR" dirty="0" err="1"/>
+              <a:t>Accuracy</a:t>
+            </a:r>
+            <a:r>
+              <a:rPr lang="tr-TR" dirty="0"/>
+              <a:t> of </a:t>
+            </a:r>
+            <a:r>
+              <a:rPr lang="tr-TR" dirty="0" err="1"/>
+              <a:t>the</a:t>
+            </a:r>
+            <a:r>
+              <a:rPr lang="tr-TR" dirty="0"/>
+              <a:t> </a:t>
+            </a:r>
+            <a:r>
+              <a:rPr lang="tr-TR" dirty="0" err="1"/>
+              <a:t>BiLSTM</a:t>
+            </a:r>
+            <a:r>
+              <a:rPr lang="tr-TR" dirty="0"/>
+              <a:t> model : </a:t>
+            </a:r>
+            <a:r>
+              <a:rPr lang="tr-TR" i="0" dirty="0">
+                <a:effectLst/>
+                <a:latin typeface="Menlo" panose="020B0609030804020204" pitchFamily="49" charset="0"/>
+              </a:rPr>
+              <a:t>0.9348</a:t>
+            </a:r>
+            <a:endParaRPr lang="tr-TR" dirty="0"/>
           </a:p>
         </p:txBody>
       </p:sp>
@@ -9234,7 +9271,7 @@
           <p:nvPr>
             <p:extLst>
               <p:ext uri="{D42A27DB-BD31-4B8C-83A1-F6EECF244321}">
-                <p14:modId xmlns:p14="http://schemas.microsoft.com/office/powerpoint/2010/main" val="2040923827"/>
+                <p14:modId xmlns:p14="http://schemas.microsoft.com/office/powerpoint/2010/main" val="970527843"/>
               </p:ext>
             </p:extLst>
           </p:nvPr>
@@ -9450,8 +9487,8 @@
                         <a:defRPr/>
                       </a:pPr>
                       <a:r>
-                        <a:rPr lang="tr-TR" dirty="0"/>
-                        <a:t>19.01 </a:t>
+                        <a:rPr lang="tr-TR"/>
+                        <a:t>19.75 </a:t>
                       </a:r>
                       <a:r>
                         <a:rPr lang="tr-TR" dirty="0" err="1"/>
@@ -9537,7 +9574,7 @@
                     <a:p>
                       <a:r>
                         <a:rPr lang="tr-TR" dirty="0"/>
-                        <a:t>46.97 </a:t>
+                        <a:t>46.87 </a:t>
                       </a:r>
                       <a:r>
                         <a:rPr lang="tr-TR" dirty="0" err="1"/>
@@ -9660,7 +9697,7 @@
                       </a:pPr>
                       <a:r>
                         <a:rPr lang="tr-TR" dirty="0"/>
-                        <a:t>600.43 </a:t>
+                        <a:t>584.91 </a:t>
                       </a:r>
                       <a:r>
                         <a:rPr lang="tr-TR" dirty="0" err="1"/>

</xml_diff>